<commit_message>
compress all powerpoints v1.0
compress all powerpoints v1.0
</commit_message>
<xml_diff>
--- a/04kodu/l 2kodu icons 1.pptx
+++ b/04kodu/l 2kodu icons 1.pptx
@@ -297,7 +297,7 @@
             <a:fld id="{1D8BD707-D9CF-40AE-B4C6-C98DA3205C09}" type="datetimeFigureOut">
               <a:rPr lang="en-US" smtClean="0"/>
               <a:pPr/>
-              <a:t>1/4/2013</a:t>
+              <a:t>12/10/2016</a:t>
             </a:fld>
             <a:endParaRPr lang="en-US"/>
           </a:p>
@@ -464,7 +464,7 @@
             <a:fld id="{1D8BD707-D9CF-40AE-B4C6-C98DA3205C09}" type="datetimeFigureOut">
               <a:rPr lang="en-US" smtClean="0"/>
               <a:pPr/>
-              <a:t>1/4/2013</a:t>
+              <a:t>12/10/2016</a:t>
             </a:fld>
             <a:endParaRPr lang="en-US"/>
           </a:p>
@@ -641,7 +641,7 @@
             <a:fld id="{1D8BD707-D9CF-40AE-B4C6-C98DA3205C09}" type="datetimeFigureOut">
               <a:rPr lang="en-US" smtClean="0"/>
               <a:pPr/>
-              <a:t>1/4/2013</a:t>
+              <a:t>12/10/2016</a:t>
             </a:fld>
             <a:endParaRPr lang="en-US"/>
           </a:p>
@@ -808,7 +808,7 @@
             <a:fld id="{1D8BD707-D9CF-40AE-B4C6-C98DA3205C09}" type="datetimeFigureOut">
               <a:rPr lang="en-US" smtClean="0"/>
               <a:pPr/>
-              <a:t>1/4/2013</a:t>
+              <a:t>12/10/2016</a:t>
             </a:fld>
             <a:endParaRPr lang="en-US"/>
           </a:p>
@@ -1051,7 +1051,7 @@
             <a:fld id="{1D8BD707-D9CF-40AE-B4C6-C98DA3205C09}" type="datetimeFigureOut">
               <a:rPr lang="en-US" smtClean="0"/>
               <a:pPr/>
-              <a:t>1/4/2013</a:t>
+              <a:t>12/10/2016</a:t>
             </a:fld>
             <a:endParaRPr lang="en-US"/>
           </a:p>
@@ -1336,7 +1336,7 @@
             <a:fld id="{1D8BD707-D9CF-40AE-B4C6-C98DA3205C09}" type="datetimeFigureOut">
               <a:rPr lang="en-US" smtClean="0"/>
               <a:pPr/>
-              <a:t>1/4/2013</a:t>
+              <a:t>12/10/2016</a:t>
             </a:fld>
             <a:endParaRPr lang="en-US"/>
           </a:p>
@@ -1755,7 +1755,7 @@
             <a:fld id="{1D8BD707-D9CF-40AE-B4C6-C98DA3205C09}" type="datetimeFigureOut">
               <a:rPr lang="en-US" smtClean="0"/>
               <a:pPr/>
-              <a:t>1/4/2013</a:t>
+              <a:t>12/10/2016</a:t>
             </a:fld>
             <a:endParaRPr lang="en-US"/>
           </a:p>
@@ -1870,7 +1870,7 @@
             <a:fld id="{1D8BD707-D9CF-40AE-B4C6-C98DA3205C09}" type="datetimeFigureOut">
               <a:rPr lang="en-US" smtClean="0"/>
               <a:pPr/>
-              <a:t>1/4/2013</a:t>
+              <a:t>12/10/2016</a:t>
             </a:fld>
             <a:endParaRPr lang="en-US"/>
           </a:p>
@@ -1962,7 +1962,7 @@
             <a:fld id="{1D8BD707-D9CF-40AE-B4C6-C98DA3205C09}" type="datetimeFigureOut">
               <a:rPr lang="en-US" smtClean="0"/>
               <a:pPr/>
-              <a:t>1/4/2013</a:t>
+              <a:t>12/10/2016</a:t>
             </a:fld>
             <a:endParaRPr lang="en-US"/>
           </a:p>
@@ -2236,7 +2236,7 @@
             <a:fld id="{1D8BD707-D9CF-40AE-B4C6-C98DA3205C09}" type="datetimeFigureOut">
               <a:rPr lang="en-US" smtClean="0"/>
               <a:pPr/>
-              <a:t>1/4/2013</a:t>
+              <a:t>12/10/2016</a:t>
             </a:fld>
             <a:endParaRPr lang="en-US"/>
           </a:p>
@@ -2486,7 +2486,7 @@
             <a:fld id="{1D8BD707-D9CF-40AE-B4C6-C98DA3205C09}" type="datetimeFigureOut">
               <a:rPr lang="en-US" smtClean="0"/>
               <a:pPr/>
-              <a:t>1/4/2013</a:t>
+              <a:t>12/10/2016</a:t>
             </a:fld>
             <a:endParaRPr lang="en-US"/>
           </a:p>
@@ -2696,7 +2696,7 @@
             <a:fld id="{1D8BD707-D9CF-40AE-B4C6-C98DA3205C09}" type="datetimeFigureOut">
               <a:rPr lang="en-US" smtClean="0"/>
               <a:pPr/>
-              <a:t>1/4/2013</a:t>
+              <a:t>12/10/2016</a:t>
             </a:fld>
             <a:endParaRPr lang="en-US"/>
           </a:p>
@@ -3112,20 +3112,15 @@
             <a:pPr lvl="0"/>
             <a:r>
               <a:rPr lang="en-GB" dirty="0" smtClean="0"/>
-              <a:t>Starter </a:t>
+              <a:t>Starter objects(blue)</a:t>
             </a:r>
-            <a:r>
-              <a:rPr lang="en-GB" dirty="0" smtClean="0"/>
-              <a:t>objects(blue)</a:t>
-            </a:r>
-            <a:endParaRPr lang="en-GB" dirty="0" smtClean="0"/>
           </a:p>
         </p:txBody>
       </p:sp>
     </p:spTree>
     <p:extLst>
       <p:ext uri="{BB962C8B-B14F-4D97-AF65-F5344CB8AC3E}">
-        <p14:creationId xmlns:p14="http://schemas.microsoft.com/office/powerpoint/2010/main" val="2446753324"/>
+        <p14:creationId xmlns:p14="http://schemas.microsoft.com/office/powerpoint/2010/main" xmlns="" val="2446753324"/>
       </p:ext>
     </p:extLst>
   </p:cSld>
@@ -3218,7 +3213,7 @@
           <p:nvPr/>
         </p:nvPicPr>
         <p:blipFill rotWithShape="1">
-          <a:blip r:embed="rId2" cstate="print">
+          <a:blip r:embed="rId2" cstate="email">
             <a:clrChange>
               <a:clrFrom>
                 <a:srgbClr val="FFFFFF"/>
@@ -3231,7 +3226,7 @@
             </a:clrChange>
             <a:extLst>
               <a:ext uri="{28A0092B-C50C-407E-A947-70E740481C1C}">
-                <a14:useLocalDpi xmlns:a14="http://schemas.microsoft.com/office/drawing/2010/main" val="0"/>
+                <a14:useLocalDpi xmlns:a14="http://schemas.microsoft.com/office/drawing/2010/main" xmlns="" val="0"/>
               </a:ext>
             </a:extLst>
           </a:blip>
@@ -3253,14 +3248,14 @@
           <a:effectLst/>
           <a:extLst>
             <a:ext uri="{909E8E84-426E-40DD-AFC4-6F175D3DCCD1}">
-              <a14:hiddenFill xmlns:a14="http://schemas.microsoft.com/office/drawing/2010/main">
+              <a14:hiddenFill xmlns:a14="http://schemas.microsoft.com/office/drawing/2010/main" xmlns="">
                 <a:solidFill>
                   <a:schemeClr val="accent1"/>
                 </a:solidFill>
               </a14:hiddenFill>
             </a:ext>
             <a:ext uri="{91240B29-F687-4F45-9708-019B960494DF}">
-              <a14:hiddenLine xmlns:a14="http://schemas.microsoft.com/office/drawing/2010/main" w="9525">
+              <a14:hiddenLine xmlns:a14="http://schemas.microsoft.com/office/drawing/2010/main" xmlns="" w="9525">
                 <a:solidFill>
                   <a:schemeClr val="tx1"/>
                 </a:solidFill>
@@ -3270,7 +3265,7 @@
               </a14:hiddenLine>
             </a:ext>
             <a:ext uri="{AF507438-7753-43E0-B8FC-AC1667EBCBE1}">
-              <a14:hiddenEffects xmlns:a14="http://schemas.microsoft.com/office/drawing/2010/main">
+              <a14:hiddenEffects xmlns:a14="http://schemas.microsoft.com/office/drawing/2010/main" xmlns="">
                 <a:effectLst>
                   <a:outerShdw dist="35921" dir="2700000" algn="ctr" rotWithShape="0">
                     <a:schemeClr val="bg2"/>
@@ -3468,7 +3463,7 @@
     </p:spTree>
     <p:extLst>
       <p:ext uri="{BB962C8B-B14F-4D97-AF65-F5344CB8AC3E}">
-        <p14:creationId xmlns:p14="http://schemas.microsoft.com/office/powerpoint/2010/main" val="4208498720"/>
+        <p14:creationId xmlns:p14="http://schemas.microsoft.com/office/powerpoint/2010/main" xmlns="" val="4208498720"/>
       </p:ext>
     </p:extLst>
   </p:cSld>
@@ -3752,7 +3747,7 @@
           <p:nvPr/>
         </p:nvPicPr>
         <p:blipFill rotWithShape="1">
-          <a:blip r:embed="rId2" cstate="print">
+          <a:blip r:embed="rId2" cstate="email">
             <a:clrChange>
               <a:clrFrom>
                 <a:srgbClr val="FFFFFF"/>
@@ -3765,7 +3760,7 @@
             </a:clrChange>
             <a:extLst>
               <a:ext uri="{28A0092B-C50C-407E-A947-70E740481C1C}">
-                <a14:useLocalDpi xmlns:a14="http://schemas.microsoft.com/office/drawing/2010/main" val="0"/>
+                <a14:useLocalDpi xmlns:a14="http://schemas.microsoft.com/office/drawing/2010/main" xmlns="" val="0"/>
               </a:ext>
             </a:extLst>
           </a:blip>
@@ -3787,14 +3782,14 @@
           <a:effectLst/>
           <a:extLst>
             <a:ext uri="{909E8E84-426E-40DD-AFC4-6F175D3DCCD1}">
-              <a14:hiddenFill xmlns:a14="http://schemas.microsoft.com/office/drawing/2010/main">
+              <a14:hiddenFill xmlns:a14="http://schemas.microsoft.com/office/drawing/2010/main" xmlns="">
                 <a:solidFill>
                   <a:schemeClr val="accent1"/>
                 </a:solidFill>
               </a14:hiddenFill>
             </a:ext>
             <a:ext uri="{91240B29-F687-4F45-9708-019B960494DF}">
-              <a14:hiddenLine xmlns:a14="http://schemas.microsoft.com/office/drawing/2010/main" w="9525">
+              <a14:hiddenLine xmlns:a14="http://schemas.microsoft.com/office/drawing/2010/main" xmlns="" w="9525">
                 <a:solidFill>
                   <a:schemeClr val="tx1"/>
                 </a:solidFill>
@@ -3804,7 +3799,7 @@
               </a14:hiddenLine>
             </a:ext>
             <a:ext uri="{AF507438-7753-43E0-B8FC-AC1667EBCBE1}">
-              <a14:hiddenEffects xmlns:a14="http://schemas.microsoft.com/office/drawing/2010/main">
+              <a14:hiddenEffects xmlns:a14="http://schemas.microsoft.com/office/drawing/2010/main" xmlns="">
                 <a:effectLst>
                   <a:outerShdw dist="35921" dir="2700000" algn="ctr" rotWithShape="0">
                     <a:schemeClr val="bg2"/>
@@ -4052,7 +4047,7 @@
     </p:spTree>
     <p:extLst>
       <p:ext uri="{BB962C8B-B14F-4D97-AF65-F5344CB8AC3E}">
-        <p14:creationId xmlns:p14="http://schemas.microsoft.com/office/powerpoint/2010/main" val="3982200694"/>
+        <p14:creationId xmlns:p14="http://schemas.microsoft.com/office/powerpoint/2010/main" xmlns="" val="3982200694"/>
       </p:ext>
     </p:extLst>
   </p:cSld>
@@ -4336,10 +4331,10 @@
           <p:nvPr/>
         </p:nvPicPr>
         <p:blipFill rotWithShape="1">
-          <a:blip r:embed="rId2" cstate="print">
+          <a:blip r:embed="rId2" cstate="email">
             <a:extLst>
               <a:ext uri="{28A0092B-C50C-407E-A947-70E740481C1C}">
-                <a14:useLocalDpi xmlns:a14="http://schemas.microsoft.com/office/drawing/2010/main" val="0"/>
+                <a14:useLocalDpi xmlns:a14="http://schemas.microsoft.com/office/drawing/2010/main" xmlns="" val="0"/>
               </a:ext>
             </a:extLst>
           </a:blip>
@@ -4361,14 +4356,14 @@
           <a:effectLst/>
           <a:extLst>
             <a:ext uri="{909E8E84-426E-40DD-AFC4-6F175D3DCCD1}">
-              <a14:hiddenFill xmlns:a14="http://schemas.microsoft.com/office/drawing/2010/main">
+              <a14:hiddenFill xmlns:a14="http://schemas.microsoft.com/office/drawing/2010/main" xmlns="">
                 <a:solidFill>
                   <a:schemeClr val="accent1"/>
                 </a:solidFill>
               </a14:hiddenFill>
             </a:ext>
             <a:ext uri="{91240B29-F687-4F45-9708-019B960494DF}">
-              <a14:hiddenLine xmlns:a14="http://schemas.microsoft.com/office/drawing/2010/main" w="9525">
+              <a14:hiddenLine xmlns:a14="http://schemas.microsoft.com/office/drawing/2010/main" xmlns="" w="9525">
                 <a:solidFill>
                   <a:schemeClr val="tx1"/>
                 </a:solidFill>
@@ -4378,7 +4373,7 @@
               </a14:hiddenLine>
             </a:ext>
             <a:ext uri="{AF507438-7753-43E0-B8FC-AC1667EBCBE1}">
-              <a14:hiddenEffects xmlns:a14="http://schemas.microsoft.com/office/drawing/2010/main">
+              <a14:hiddenEffects xmlns:a14="http://schemas.microsoft.com/office/drawing/2010/main" xmlns="">
                 <a:effectLst>
                   <a:outerShdw dist="35921" dir="2700000" algn="ctr" rotWithShape="0">
                     <a:schemeClr val="bg2"/>
@@ -4626,7 +4621,7 @@
     </p:spTree>
     <p:extLst>
       <p:ext uri="{BB962C8B-B14F-4D97-AF65-F5344CB8AC3E}">
-        <p14:creationId xmlns:p14="http://schemas.microsoft.com/office/powerpoint/2010/main" val="3847733696"/>
+        <p14:creationId xmlns:p14="http://schemas.microsoft.com/office/powerpoint/2010/main" xmlns="" val="3847733696"/>
       </p:ext>
     </p:extLst>
   </p:cSld>
@@ -4910,10 +4905,10 @@
           <p:nvPr/>
         </p:nvPicPr>
         <p:blipFill rotWithShape="1">
-          <a:blip r:embed="rId2" cstate="print">
+          <a:blip r:embed="rId2" cstate="email">
             <a:extLst>
               <a:ext uri="{28A0092B-C50C-407E-A947-70E740481C1C}">
-                <a14:useLocalDpi xmlns:a14="http://schemas.microsoft.com/office/drawing/2010/main" val="0"/>
+                <a14:useLocalDpi xmlns:a14="http://schemas.microsoft.com/office/drawing/2010/main" xmlns="" val="0"/>
               </a:ext>
             </a:extLst>
           </a:blip>
@@ -4935,14 +4930,14 @@
           <a:effectLst/>
           <a:extLst>
             <a:ext uri="{909E8E84-426E-40DD-AFC4-6F175D3DCCD1}">
-              <a14:hiddenFill xmlns:a14="http://schemas.microsoft.com/office/drawing/2010/main">
+              <a14:hiddenFill xmlns:a14="http://schemas.microsoft.com/office/drawing/2010/main" xmlns="">
                 <a:solidFill>
                   <a:schemeClr val="accent1"/>
                 </a:solidFill>
               </a14:hiddenFill>
             </a:ext>
             <a:ext uri="{91240B29-F687-4F45-9708-019B960494DF}">
-              <a14:hiddenLine xmlns:a14="http://schemas.microsoft.com/office/drawing/2010/main" w="9525">
+              <a14:hiddenLine xmlns:a14="http://schemas.microsoft.com/office/drawing/2010/main" xmlns="" w="9525">
                 <a:solidFill>
                   <a:schemeClr val="tx1"/>
                 </a:solidFill>
@@ -4952,7 +4947,7 @@
               </a14:hiddenLine>
             </a:ext>
             <a:ext uri="{AF507438-7753-43E0-B8FC-AC1667EBCBE1}">
-              <a14:hiddenEffects xmlns:a14="http://schemas.microsoft.com/office/drawing/2010/main">
+              <a14:hiddenEffects xmlns:a14="http://schemas.microsoft.com/office/drawing/2010/main" xmlns="">
                 <a:effectLst>
                   <a:outerShdw dist="35921" dir="2700000" algn="ctr" rotWithShape="0">
                     <a:schemeClr val="bg2"/>
@@ -5200,7 +5195,7 @@
     </p:spTree>
     <p:extLst>
       <p:ext uri="{BB962C8B-B14F-4D97-AF65-F5344CB8AC3E}">
-        <p14:creationId xmlns:p14="http://schemas.microsoft.com/office/powerpoint/2010/main" val="2076599793"/>
+        <p14:creationId xmlns:p14="http://schemas.microsoft.com/office/powerpoint/2010/main" xmlns="" val="2076599793"/>
       </p:ext>
     </p:extLst>
   </p:cSld>
@@ -5484,10 +5479,10 @@
           <p:nvPr/>
         </p:nvPicPr>
         <p:blipFill rotWithShape="1">
-          <a:blip r:embed="rId2" cstate="print">
+          <a:blip r:embed="rId2" cstate="email">
             <a:extLst>
               <a:ext uri="{28A0092B-C50C-407E-A947-70E740481C1C}">
-                <a14:useLocalDpi xmlns:a14="http://schemas.microsoft.com/office/drawing/2010/main" val="0"/>
+                <a14:useLocalDpi xmlns:a14="http://schemas.microsoft.com/office/drawing/2010/main" xmlns="" val="0"/>
               </a:ext>
             </a:extLst>
           </a:blip>
@@ -5509,14 +5504,14 @@
           <a:effectLst/>
           <a:extLst>
             <a:ext uri="{909E8E84-426E-40DD-AFC4-6F175D3DCCD1}">
-              <a14:hiddenFill xmlns:a14="http://schemas.microsoft.com/office/drawing/2010/main">
+              <a14:hiddenFill xmlns:a14="http://schemas.microsoft.com/office/drawing/2010/main" xmlns="">
                 <a:solidFill>
                   <a:schemeClr val="accent1"/>
                 </a:solidFill>
               </a14:hiddenFill>
             </a:ext>
             <a:ext uri="{91240B29-F687-4F45-9708-019B960494DF}">
-              <a14:hiddenLine xmlns:a14="http://schemas.microsoft.com/office/drawing/2010/main" w="9525">
+              <a14:hiddenLine xmlns:a14="http://schemas.microsoft.com/office/drawing/2010/main" xmlns="" w="9525">
                 <a:solidFill>
                   <a:schemeClr val="tx1"/>
                 </a:solidFill>
@@ -5526,7 +5521,7 @@
               </a14:hiddenLine>
             </a:ext>
             <a:ext uri="{AF507438-7753-43E0-B8FC-AC1667EBCBE1}">
-              <a14:hiddenEffects xmlns:a14="http://schemas.microsoft.com/office/drawing/2010/main">
+              <a14:hiddenEffects xmlns:a14="http://schemas.microsoft.com/office/drawing/2010/main" xmlns="">
                 <a:effectLst>
                   <a:outerShdw dist="35921" dir="2700000" algn="ctr" rotWithShape="0">
                     <a:schemeClr val="bg2"/>
@@ -5774,7 +5769,7 @@
     </p:spTree>
     <p:extLst>
       <p:ext uri="{BB962C8B-B14F-4D97-AF65-F5344CB8AC3E}">
-        <p14:creationId xmlns:p14="http://schemas.microsoft.com/office/powerpoint/2010/main" val="3273502460"/>
+        <p14:creationId xmlns:p14="http://schemas.microsoft.com/office/powerpoint/2010/main" xmlns="" val="3273502460"/>
       </p:ext>
     </p:extLst>
   </p:cSld>
@@ -6058,10 +6053,10 @@
           <p:nvPr/>
         </p:nvPicPr>
         <p:blipFill rotWithShape="1">
-          <a:blip r:embed="rId2" cstate="print">
+          <a:blip r:embed="rId2" cstate="email">
             <a:extLst>
               <a:ext uri="{28A0092B-C50C-407E-A947-70E740481C1C}">
-                <a14:useLocalDpi xmlns:a14="http://schemas.microsoft.com/office/drawing/2010/main" val="0"/>
+                <a14:useLocalDpi xmlns:a14="http://schemas.microsoft.com/office/drawing/2010/main" xmlns="" val="0"/>
               </a:ext>
             </a:extLst>
           </a:blip>
@@ -6083,14 +6078,14 @@
           <a:effectLst/>
           <a:extLst>
             <a:ext uri="{909E8E84-426E-40DD-AFC4-6F175D3DCCD1}">
-              <a14:hiddenFill xmlns:a14="http://schemas.microsoft.com/office/drawing/2010/main">
+              <a14:hiddenFill xmlns:a14="http://schemas.microsoft.com/office/drawing/2010/main" xmlns="">
                 <a:solidFill>
                   <a:schemeClr val="accent1"/>
                 </a:solidFill>
               </a14:hiddenFill>
             </a:ext>
             <a:ext uri="{91240B29-F687-4F45-9708-019B960494DF}">
-              <a14:hiddenLine xmlns:a14="http://schemas.microsoft.com/office/drawing/2010/main" w="9525">
+              <a14:hiddenLine xmlns:a14="http://schemas.microsoft.com/office/drawing/2010/main" xmlns="" w="9525">
                 <a:solidFill>
                   <a:schemeClr val="tx1"/>
                 </a:solidFill>
@@ -6100,7 +6095,7 @@
               </a14:hiddenLine>
             </a:ext>
             <a:ext uri="{AF507438-7753-43E0-B8FC-AC1667EBCBE1}">
-              <a14:hiddenEffects xmlns:a14="http://schemas.microsoft.com/office/drawing/2010/main">
+              <a14:hiddenEffects xmlns:a14="http://schemas.microsoft.com/office/drawing/2010/main" xmlns="">
                 <a:effectLst>
                   <a:outerShdw dist="35921" dir="2700000" algn="ctr" rotWithShape="0">
                     <a:schemeClr val="bg2"/>
@@ -6348,7 +6343,7 @@
     </p:spTree>
     <p:extLst>
       <p:ext uri="{BB962C8B-B14F-4D97-AF65-F5344CB8AC3E}">
-        <p14:creationId xmlns:p14="http://schemas.microsoft.com/office/powerpoint/2010/main" val="267894348"/>
+        <p14:creationId xmlns:p14="http://schemas.microsoft.com/office/powerpoint/2010/main" xmlns="" val="267894348"/>
       </p:ext>
     </p:extLst>
   </p:cSld>
@@ -6632,10 +6627,10 @@
           <p:nvPr/>
         </p:nvPicPr>
         <p:blipFill rotWithShape="1">
-          <a:blip r:embed="rId2" cstate="print">
+          <a:blip r:embed="rId2" cstate="email">
             <a:extLst>
               <a:ext uri="{28A0092B-C50C-407E-A947-70E740481C1C}">
-                <a14:useLocalDpi xmlns:a14="http://schemas.microsoft.com/office/drawing/2010/main" val="0"/>
+                <a14:useLocalDpi xmlns:a14="http://schemas.microsoft.com/office/drawing/2010/main" xmlns="" val="0"/>
               </a:ext>
             </a:extLst>
           </a:blip>
@@ -6657,14 +6652,14 @@
           <a:effectLst/>
           <a:extLst>
             <a:ext uri="{909E8E84-426E-40DD-AFC4-6F175D3DCCD1}">
-              <a14:hiddenFill xmlns:a14="http://schemas.microsoft.com/office/drawing/2010/main">
+              <a14:hiddenFill xmlns:a14="http://schemas.microsoft.com/office/drawing/2010/main" xmlns="">
                 <a:solidFill>
                   <a:schemeClr val="accent1"/>
                 </a:solidFill>
               </a14:hiddenFill>
             </a:ext>
             <a:ext uri="{91240B29-F687-4F45-9708-019B960494DF}">
-              <a14:hiddenLine xmlns:a14="http://schemas.microsoft.com/office/drawing/2010/main" w="9525">
+              <a14:hiddenLine xmlns:a14="http://schemas.microsoft.com/office/drawing/2010/main" xmlns="" w="9525">
                 <a:solidFill>
                   <a:schemeClr val="tx1"/>
                 </a:solidFill>
@@ -6674,7 +6669,7 @@
               </a14:hiddenLine>
             </a:ext>
             <a:ext uri="{AF507438-7753-43E0-B8FC-AC1667EBCBE1}">
-              <a14:hiddenEffects xmlns:a14="http://schemas.microsoft.com/office/drawing/2010/main">
+              <a14:hiddenEffects xmlns:a14="http://schemas.microsoft.com/office/drawing/2010/main" xmlns="">
                 <a:effectLst>
                   <a:outerShdw dist="35921" dir="2700000" algn="ctr" rotWithShape="0">
                     <a:schemeClr val="bg2"/>
@@ -6694,10 +6689,10 @@
           <p:nvPr/>
         </p:nvPicPr>
         <p:blipFill rotWithShape="1">
-          <a:blip r:embed="rId3" cstate="print">
+          <a:blip r:embed="rId3" cstate="email">
             <a:extLst>
               <a:ext uri="{28A0092B-C50C-407E-A947-70E740481C1C}">
-                <a14:useLocalDpi xmlns:a14="http://schemas.microsoft.com/office/drawing/2010/main" val="0"/>
+                <a14:useLocalDpi xmlns:a14="http://schemas.microsoft.com/office/drawing/2010/main" xmlns="" val="0"/>
               </a:ext>
             </a:extLst>
           </a:blip>
@@ -6719,14 +6714,14 @@
           <a:effectLst/>
           <a:extLst>
             <a:ext uri="{909E8E84-426E-40DD-AFC4-6F175D3DCCD1}">
-              <a14:hiddenFill xmlns:a14="http://schemas.microsoft.com/office/drawing/2010/main">
+              <a14:hiddenFill xmlns:a14="http://schemas.microsoft.com/office/drawing/2010/main" xmlns="">
                 <a:solidFill>
                   <a:schemeClr val="accent1"/>
                 </a:solidFill>
               </a14:hiddenFill>
             </a:ext>
             <a:ext uri="{91240B29-F687-4F45-9708-019B960494DF}">
-              <a14:hiddenLine xmlns:a14="http://schemas.microsoft.com/office/drawing/2010/main" w="9525">
+              <a14:hiddenLine xmlns:a14="http://schemas.microsoft.com/office/drawing/2010/main" xmlns="" w="9525">
                 <a:solidFill>
                   <a:schemeClr val="tx1"/>
                 </a:solidFill>
@@ -6736,7 +6731,7 @@
               </a14:hiddenLine>
             </a:ext>
             <a:ext uri="{AF507438-7753-43E0-B8FC-AC1667EBCBE1}">
-              <a14:hiddenEffects xmlns:a14="http://schemas.microsoft.com/office/drawing/2010/main">
+              <a14:hiddenEffects xmlns:a14="http://schemas.microsoft.com/office/drawing/2010/main" xmlns="">
                 <a:effectLst>
                   <a:outerShdw dist="35921" dir="2700000" algn="ctr" rotWithShape="0">
                     <a:schemeClr val="bg2"/>
@@ -6984,7 +6979,7 @@
     </p:spTree>
     <p:extLst>
       <p:ext uri="{BB962C8B-B14F-4D97-AF65-F5344CB8AC3E}">
-        <p14:creationId xmlns:p14="http://schemas.microsoft.com/office/powerpoint/2010/main" val="2758008867"/>
+        <p14:creationId xmlns:p14="http://schemas.microsoft.com/office/powerpoint/2010/main" xmlns="" val="2758008867"/>
       </p:ext>
     </p:extLst>
   </p:cSld>
@@ -7268,10 +7263,10 @@
           <p:nvPr/>
         </p:nvPicPr>
         <p:blipFill rotWithShape="1">
-          <a:blip r:embed="rId2" cstate="print">
+          <a:blip r:embed="rId2" cstate="email">
             <a:extLst>
               <a:ext uri="{28A0092B-C50C-407E-A947-70E740481C1C}">
-                <a14:useLocalDpi xmlns:a14="http://schemas.microsoft.com/office/drawing/2010/main" val="0"/>
+                <a14:useLocalDpi xmlns:a14="http://schemas.microsoft.com/office/drawing/2010/main" xmlns="" val="0"/>
               </a:ext>
             </a:extLst>
           </a:blip>
@@ -7293,14 +7288,14 @@
           <a:effectLst/>
           <a:extLst>
             <a:ext uri="{909E8E84-426E-40DD-AFC4-6F175D3DCCD1}">
-              <a14:hiddenFill xmlns:a14="http://schemas.microsoft.com/office/drawing/2010/main">
+              <a14:hiddenFill xmlns:a14="http://schemas.microsoft.com/office/drawing/2010/main" xmlns="">
                 <a:solidFill>
                   <a:schemeClr val="accent1"/>
                 </a:solidFill>
               </a14:hiddenFill>
             </a:ext>
             <a:ext uri="{91240B29-F687-4F45-9708-019B960494DF}">
-              <a14:hiddenLine xmlns:a14="http://schemas.microsoft.com/office/drawing/2010/main" w="9525">
+              <a14:hiddenLine xmlns:a14="http://schemas.microsoft.com/office/drawing/2010/main" xmlns="" w="9525">
                 <a:solidFill>
                   <a:schemeClr val="tx1"/>
                 </a:solidFill>
@@ -7310,7 +7305,7 @@
               </a14:hiddenLine>
             </a:ext>
             <a:ext uri="{AF507438-7753-43E0-B8FC-AC1667EBCBE1}">
-              <a14:hiddenEffects xmlns:a14="http://schemas.microsoft.com/office/drawing/2010/main">
+              <a14:hiddenEffects xmlns:a14="http://schemas.microsoft.com/office/drawing/2010/main" xmlns="">
                 <a:effectLst>
                   <a:outerShdw dist="35921" dir="2700000" algn="ctr" rotWithShape="0">
                     <a:schemeClr val="bg2"/>
@@ -7330,10 +7325,10 @@
           <p:nvPr/>
         </p:nvPicPr>
         <p:blipFill rotWithShape="1">
-          <a:blip r:embed="rId3" cstate="print">
+          <a:blip r:embed="rId3" cstate="email">
             <a:extLst>
               <a:ext uri="{28A0092B-C50C-407E-A947-70E740481C1C}">
-                <a14:useLocalDpi xmlns:a14="http://schemas.microsoft.com/office/drawing/2010/main" val="0"/>
+                <a14:useLocalDpi xmlns:a14="http://schemas.microsoft.com/office/drawing/2010/main" xmlns="" val="0"/>
               </a:ext>
             </a:extLst>
           </a:blip>
@@ -7355,14 +7350,14 @@
           <a:effectLst/>
           <a:extLst>
             <a:ext uri="{909E8E84-426E-40DD-AFC4-6F175D3DCCD1}">
-              <a14:hiddenFill xmlns:a14="http://schemas.microsoft.com/office/drawing/2010/main">
+              <a14:hiddenFill xmlns:a14="http://schemas.microsoft.com/office/drawing/2010/main" xmlns="">
                 <a:solidFill>
                   <a:schemeClr val="accent1"/>
                 </a:solidFill>
               </a14:hiddenFill>
             </a:ext>
             <a:ext uri="{91240B29-F687-4F45-9708-019B960494DF}">
-              <a14:hiddenLine xmlns:a14="http://schemas.microsoft.com/office/drawing/2010/main" w="9525">
+              <a14:hiddenLine xmlns:a14="http://schemas.microsoft.com/office/drawing/2010/main" xmlns="" w="9525">
                 <a:solidFill>
                   <a:schemeClr val="tx1"/>
                 </a:solidFill>
@@ -7372,7 +7367,7 @@
               </a14:hiddenLine>
             </a:ext>
             <a:ext uri="{AF507438-7753-43E0-B8FC-AC1667EBCBE1}">
-              <a14:hiddenEffects xmlns:a14="http://schemas.microsoft.com/office/drawing/2010/main">
+              <a14:hiddenEffects xmlns:a14="http://schemas.microsoft.com/office/drawing/2010/main" xmlns="">
                 <a:effectLst>
                   <a:outerShdw dist="35921" dir="2700000" algn="ctr" rotWithShape="0">
                     <a:schemeClr val="bg2"/>
@@ -7620,7 +7615,7 @@
     </p:spTree>
     <p:extLst>
       <p:ext uri="{BB962C8B-B14F-4D97-AF65-F5344CB8AC3E}">
-        <p14:creationId xmlns:p14="http://schemas.microsoft.com/office/powerpoint/2010/main" val="965253588"/>
+        <p14:creationId xmlns:p14="http://schemas.microsoft.com/office/powerpoint/2010/main" xmlns="" val="965253588"/>
       </p:ext>
     </p:extLst>
   </p:cSld>

</xml_diff>